<commit_message>
updates to plots and text
</commit_message>
<xml_diff>
--- a/thesis/slides/Flow_diagrams.pptx
+++ b/thesis/slides/Flow_diagrams.pptx
@@ -8,6 +8,7 @@
     <p:sldId id="256" r:id="rId2"/>
     <p:sldId id="258" r:id="rId3"/>
     <p:sldId id="257" r:id="rId4"/>
+    <p:sldId id="259" r:id="rId5"/>
   </p:sldIdLst>
   <p:sldSz cx="9144000" cy="6858000" type="screen4x3"/>
   <p:notesSz cx="6858000" cy="9144000"/>
@@ -290,7 +291,7 @@
           <a:p>
             <a:fld id="{1F29420F-5315-E44F-ACAA-064270912B3B}" type="datetimeFigureOut">
               <a:rPr lang="en-US" smtClean="0"/>
-              <a:t>7/13/14</a:t>
+              <a:t>8/8/14</a:t>
             </a:fld>
             <a:endParaRPr lang="en-US"/>
           </a:p>
@@ -460,7 +461,7 @@
           <a:p>
             <a:fld id="{1F29420F-5315-E44F-ACAA-064270912B3B}" type="datetimeFigureOut">
               <a:rPr lang="en-US" smtClean="0"/>
-              <a:t>7/13/14</a:t>
+              <a:t>8/8/14</a:t>
             </a:fld>
             <a:endParaRPr lang="en-US"/>
           </a:p>
@@ -640,7 +641,7 @@
           <a:p>
             <a:fld id="{1F29420F-5315-E44F-ACAA-064270912B3B}" type="datetimeFigureOut">
               <a:rPr lang="en-US" smtClean="0"/>
-              <a:t>7/13/14</a:t>
+              <a:t>8/8/14</a:t>
             </a:fld>
             <a:endParaRPr lang="en-US"/>
           </a:p>
@@ -810,7 +811,7 @@
           <a:p>
             <a:fld id="{1F29420F-5315-E44F-ACAA-064270912B3B}" type="datetimeFigureOut">
               <a:rPr lang="en-US" smtClean="0"/>
-              <a:t>7/13/14</a:t>
+              <a:t>8/8/14</a:t>
             </a:fld>
             <a:endParaRPr lang="en-US"/>
           </a:p>
@@ -1056,7 +1057,7 @@
           <a:p>
             <a:fld id="{1F29420F-5315-E44F-ACAA-064270912B3B}" type="datetimeFigureOut">
               <a:rPr lang="en-US" smtClean="0"/>
-              <a:t>7/13/14</a:t>
+              <a:t>8/8/14</a:t>
             </a:fld>
             <a:endParaRPr lang="en-US"/>
           </a:p>
@@ -1344,7 +1345,7 @@
           <a:p>
             <a:fld id="{1F29420F-5315-E44F-ACAA-064270912B3B}" type="datetimeFigureOut">
               <a:rPr lang="en-US" smtClean="0"/>
-              <a:t>7/13/14</a:t>
+              <a:t>8/8/14</a:t>
             </a:fld>
             <a:endParaRPr lang="en-US"/>
           </a:p>
@@ -1766,7 +1767,7 @@
           <a:p>
             <a:fld id="{1F29420F-5315-E44F-ACAA-064270912B3B}" type="datetimeFigureOut">
               <a:rPr lang="en-US" smtClean="0"/>
-              <a:t>7/13/14</a:t>
+              <a:t>8/8/14</a:t>
             </a:fld>
             <a:endParaRPr lang="en-US"/>
           </a:p>
@@ -1884,7 +1885,7 @@
           <a:p>
             <a:fld id="{1F29420F-5315-E44F-ACAA-064270912B3B}" type="datetimeFigureOut">
               <a:rPr lang="en-US" smtClean="0"/>
-              <a:t>7/13/14</a:t>
+              <a:t>8/8/14</a:t>
             </a:fld>
             <a:endParaRPr lang="en-US"/>
           </a:p>
@@ -1979,7 +1980,7 @@
           <a:p>
             <a:fld id="{1F29420F-5315-E44F-ACAA-064270912B3B}" type="datetimeFigureOut">
               <a:rPr lang="en-US" smtClean="0"/>
-              <a:t>7/13/14</a:t>
+              <a:t>8/8/14</a:t>
             </a:fld>
             <a:endParaRPr lang="en-US"/>
           </a:p>
@@ -2256,7 +2257,7 @@
           <a:p>
             <a:fld id="{1F29420F-5315-E44F-ACAA-064270912B3B}" type="datetimeFigureOut">
               <a:rPr lang="en-US" smtClean="0"/>
-              <a:t>7/13/14</a:t>
+              <a:t>8/8/14</a:t>
             </a:fld>
             <a:endParaRPr lang="en-US"/>
           </a:p>
@@ -2509,7 +2510,7 @@
           <a:p>
             <a:fld id="{1F29420F-5315-E44F-ACAA-064270912B3B}" type="datetimeFigureOut">
               <a:rPr lang="en-US" smtClean="0"/>
-              <a:t>7/13/14</a:t>
+              <a:t>8/8/14</a:t>
             </a:fld>
             <a:endParaRPr lang="en-US"/>
           </a:p>
@@ -2722,7 +2723,7 @@
           <a:p>
             <a:fld id="{1F29420F-5315-E44F-ACAA-064270912B3B}" type="datetimeFigureOut">
               <a:rPr lang="en-US" smtClean="0"/>
-              <a:t>7/13/14</a:t>
+              <a:t>8/8/14</a:t>
             </a:fld>
             <a:endParaRPr lang="en-US"/>
           </a:p>
@@ -3972,11 +3973,7 @@
                 </a:r>
                 <a:r>
                   <a:rPr lang="en-US" sz="1400" dirty="0" smtClean="0"/>
-                  <a:t>. original query response and clique metrics </a:t>
-                </a:r>
-                <a:r>
-                  <a:rPr lang="en-US" sz="1400" dirty="0" smtClean="0"/>
-                  <a:t>passed to application</a:t>
+                  <a:t>. original query response and clique metrics passed to application</a:t>
                 </a:r>
                 <a:endParaRPr lang="en-US" sz="1400" dirty="0"/>
               </a:p>
@@ -4267,15 +4264,7 @@
               <a:pPr algn="ctr"/>
               <a:r>
                 <a:rPr lang="en-US" sz="1400" dirty="0" smtClean="0"/>
-                <a:t>5</a:t>
-              </a:r>
-              <a:r>
-                <a:rPr lang="en-US" sz="1400" dirty="0" smtClean="0"/>
-                <a:t>. </a:t>
-              </a:r>
-              <a:r>
-                <a:rPr lang="en-US" sz="1400" dirty="0" smtClean="0"/>
-                <a:t>compute clique metrics</a:t>
+                <a:t>5. compute clique metrics</a:t>
               </a:r>
               <a:endParaRPr lang="en-US" sz="1400" dirty="0"/>
             </a:p>
@@ -4939,6 +4928,66 @@
     <p:extLst>
       <p:ext uri="{BB962C8B-B14F-4D97-AF65-F5344CB8AC3E}">
         <p14:creationId xmlns:p14="http://schemas.microsoft.com/office/powerpoint/2010/main" val="1713901043"/>
+      </p:ext>
+    </p:extLst>
+  </p:cSld>
+  <p:clrMapOvr>
+    <a:masterClrMapping/>
+  </p:clrMapOvr>
+</p:sld>
+</file>
+
+<file path=ppt/slides/slide4.xml><?xml version="1.0" encoding="utf-8"?>
+<p:sld xmlns:a="http://schemas.openxmlformats.org/drawingml/2006/main" xmlns:r="http://schemas.openxmlformats.org/officeDocument/2006/relationships" xmlns:p="http://schemas.openxmlformats.org/presentationml/2006/main">
+  <p:cSld>
+    <p:spTree>
+      <p:nvGrpSpPr>
+        <p:cNvPr id="1" name=""/>
+        <p:cNvGrpSpPr/>
+        <p:nvPr/>
+      </p:nvGrpSpPr>
+      <p:grpSpPr>
+        <a:xfrm>
+          <a:off x="0" y="0"/>
+          <a:ext cx="0" cy="0"/>
+          <a:chOff x="0" y="0"/>
+          <a:chExt cx="0" cy="0"/>
+        </a:xfrm>
+      </p:grpSpPr>
+      <p:pic>
+        <p:nvPicPr>
+          <p:cNvPr id="2" name="Picture 1" descr="hmgcr_top10.png"/>
+          <p:cNvPicPr>
+            <a:picLocks noChangeAspect="1"/>
+          </p:cNvPicPr>
+          <p:nvPr/>
+        </p:nvPicPr>
+        <p:blipFill>
+          <a:blip r:embed="rId2">
+            <a:extLst>
+              <a:ext uri="{28A0092B-C50C-407E-A947-70E740481C1C}">
+                <a14:useLocalDpi xmlns:a14="http://schemas.microsoft.com/office/drawing/2010/main" val="0"/>
+              </a:ext>
+            </a:extLst>
+          </a:blip>
+          <a:stretch>
+            <a:fillRect/>
+          </a:stretch>
+        </p:blipFill>
+        <p:spPr>
+          <a:xfrm>
+            <a:off x="419565" y="1772351"/>
+            <a:ext cx="2451100" cy="2590800"/>
+          </a:xfrm>
+          <a:prstGeom prst="rect">
+            <a:avLst/>
+          </a:prstGeom>
+        </p:spPr>
+      </p:pic>
+    </p:spTree>
+    <p:extLst>
+      <p:ext uri="{BB962C8B-B14F-4D97-AF65-F5344CB8AC3E}">
+        <p14:creationId xmlns:p14="http://schemas.microsoft.com/office/powerpoint/2010/main" val="95631882"/>
       </p:ext>
     </p:extLst>
   </p:cSld>

</xml_diff>